<commit_message>
big poster update, have a rough draft done now
</commit_message>
<xml_diff>
--- a/mjmaslow/SYE_Poster_Maslow.pptx
+++ b/mjmaslow/SYE_Poster_Maslow.pptx
@@ -136,6 +136,15 @@
         </a:r>
       </a:p>
     </p188:txBody>
+    <p188:extLst>
+      <p:ext xmlns:p="http://schemas.openxmlformats.org/presentationml/2006/main" uri="{57CB4572-C831-44C2-8A1C-0ADB6CCDFE69}">
+        <p223:reactions xmlns:p223="http://schemas.microsoft.com/office/powerpoint/2022/03/main">
+          <p223:rxn type="👍">
+            <p223:instance time="2024-04-15T18:39:06.376" authorId="{A51B6F37-B3E1-AFA4-F2DD-FF30D967A239}"/>
+          </p223:rxn>
+        </p223:reactions>
+      </p:ext>
+    </p188:extLst>
   </p188:cm>
   <p188:cm id="{2BB77ACC-76E8-604C-BF42-0ACC75D7F63F}" authorId="{A51B6F37-B3E1-AFA4-F2DD-FF30D967A239}" created="2024-04-15T16:23:10.977">
     <ac:deMkLst xmlns:ac="http://schemas.microsoft.com/office/drawing/2013/main/command">
@@ -153,6 +162,15 @@
         </a:r>
       </a:p>
     </p188:txBody>
+    <p188:extLst>
+      <p:ext xmlns:p="http://schemas.openxmlformats.org/presentationml/2006/main" uri="{57CB4572-C831-44C2-8A1C-0ADB6CCDFE69}">
+        <p223:reactions xmlns:p223="http://schemas.microsoft.com/office/powerpoint/2022/03/main">
+          <p223:rxn type="👍">
+            <p223:instance time="2024-04-15T18:39:07.453" authorId="{A51B6F37-B3E1-AFA4-F2DD-FF30D967A239}"/>
+          </p223:rxn>
+        </p223:reactions>
+      </p:ext>
+    </p188:extLst>
   </p188:cm>
 </p188:cmLst>
 </file>
@@ -3565,8 +3583,8 @@
         </p:nvSpPr>
         <p:spPr>
           <a:xfrm>
-            <a:off x="1175658" y="7308321"/>
-            <a:ext cx="12714514" cy="4832092"/>
+            <a:off x="1191444" y="7409334"/>
+            <a:ext cx="13018379" cy="3416320"/>
           </a:xfrm>
           <a:prstGeom prst="rect">
             <a:avLst/>
@@ -3584,7 +3602,7 @@
               <a:buChar char="•"/>
             </a:pPr>
             <a:r>
-              <a:rPr lang="en-US" sz="4400" dirty="0">
+              <a:rPr lang="en-US" sz="5400" dirty="0">
                 <a:solidFill>
                   <a:schemeClr val="bg1"/>
                 </a:solidFill>
@@ -3599,39 +3617,13 @@
               <a:buChar char="•"/>
             </a:pPr>
             <a:r>
-              <a:rPr lang="en-US" sz="4400" dirty="0">
+              <a:rPr lang="en-US" sz="5400" dirty="0">
                 <a:solidFill>
                   <a:schemeClr val="bg1"/>
                 </a:solidFill>
                 <a:latin typeface="Garamond" panose="02020404030301010803" pitchFamily="18" charset="0"/>
               </a:rPr>
               <a:t>Acquires, cleans, manipulates, and documents sports data to create educational resources for data science </a:t>
-            </a:r>
-          </a:p>
-          <a:p>
-            <a:pPr marL="571500" indent="-571500">
-              <a:buFont typeface="Arial" panose="020B0604020202020204" pitchFamily="34" charset="0"/>
-              <a:buChar char="•"/>
-            </a:pPr>
-            <a:r>
-              <a:rPr lang="en-US" sz="4400" dirty="0">
-                <a:solidFill>
-                  <a:schemeClr val="bg1"/>
-                </a:solidFill>
-                <a:latin typeface="Garamond" panose="02020404030301010803" pitchFamily="18" charset="0"/>
-              </a:rPr>
-              <a:t>Particularly among under</a:t>
-            </a:r>
-            <a:r>
-              <a:rPr lang="en-US" sz="4400" dirty="0">
-                <a:solidFill>
-                  <a:schemeClr val="bg1">
-                    <a:lumMod val="95000"/>
-                  </a:schemeClr>
-                </a:solidFill>
-                <a:latin typeface="Garamond" panose="02020404030301010803" pitchFamily="18" charset="0"/>
-              </a:rPr>
-              <a:t>represented populations and minorities. It focuses on developing and spreading educational resources, with a specific emphasis on sports analytics.</a:t>
             </a:r>
           </a:p>
         </p:txBody>
@@ -3650,8 +3642,8 @@
         </p:nvSpPr>
         <p:spPr>
           <a:xfrm>
-            <a:off x="15643470" y="26218367"/>
-            <a:ext cx="12619772" cy="830227"/>
+            <a:off x="15643470" y="19677246"/>
+            <a:ext cx="12619772" cy="7853817"/>
           </a:xfrm>
           <a:prstGeom prst="rect">
             <a:avLst/>
@@ -3670,13 +3662,49 @@
               </a:lnSpc>
             </a:pPr>
             <a:r>
-              <a:rPr lang="en-US" sz="1100" dirty="0">
+              <a:rPr lang="en-US" sz="6000" dirty="0">
                 <a:solidFill>
                   <a:schemeClr val="bg1"/>
                 </a:solidFill>
                 <a:latin typeface="Garamond" panose="02020404030301010803" pitchFamily="18" charset="0"/>
               </a:rPr>
-              <a:t>Professional Bull Riding (PBR) is a sport that requires a unique combination of skill, strength, and courage. Riders must stay on a bucking bull as long as they can, using only one hand to hold on while the bull tries to throw them off. The rider is scored based on their performance, and the bull is also scored based on how well it bucks. In this dataset, we will explore the data from the 2023 season of the PBR league, Touring Pro Division, to understand the factors that contribute to a rider's success and the performance, and the same for the bulls. This dataset’s analysis encompasses linear regression, identification of influential points, hypothesis testing, and variable transformation.</a:t>
+              <a:t>What will be learned</a:t>
+            </a:r>
+          </a:p>
+          <a:p>
+            <a:pPr marL="571500" indent="-571500">
+              <a:lnSpc>
+                <a:spcPct val="150000"/>
+              </a:lnSpc>
+              <a:buFont typeface="Arial" panose="020B0604020202020204" pitchFamily="34" charset="0"/>
+              <a:buChar char="•"/>
+            </a:pPr>
+            <a:r>
+              <a:rPr lang="en-US" sz="4000" dirty="0">
+                <a:solidFill>
+                  <a:schemeClr val="bg1"/>
+                </a:solidFill>
+                <a:latin typeface="Garamond" panose="02020404030301010803" pitchFamily="18" charset="0"/>
+              </a:rPr>
+              <a:t>This dataset’s analysis encompasses linear regression, identification of influential points, hypothesis testing, and variable transformation.</a:t>
+            </a:r>
+          </a:p>
+          <a:p>
+            <a:pPr marL="571500" indent="-571500">
+              <a:lnSpc>
+                <a:spcPct val="150000"/>
+              </a:lnSpc>
+              <a:buFont typeface="Arial" panose="020B0604020202020204" pitchFamily="34" charset="0"/>
+              <a:buChar char="•"/>
+            </a:pPr>
+            <a:r>
+              <a:rPr lang="en-US" sz="4000" dirty="0">
+                <a:solidFill>
+                  <a:schemeClr val="bg1"/>
+                </a:solidFill>
+                <a:latin typeface="Garamond" panose="02020404030301010803" pitchFamily="18" charset="0"/>
+              </a:rPr>
+              <a:t>In this dataset, we will explore the data from the 2023 season of the PBR league, Touring Pro Division, to understand the factors that contribute to a rider's success and the performance, and the same for the bulls</a:t>
             </a:r>
           </a:p>
         </p:txBody>
@@ -3725,8 +3753,8 @@
         </p:nvSpPr>
         <p:spPr>
           <a:xfrm>
-            <a:off x="29917040" y="26296577"/>
-            <a:ext cx="13108359" cy="830227"/>
+            <a:off x="29607150" y="22007053"/>
+            <a:ext cx="13108359" cy="5083828"/>
           </a:xfrm>
           <a:prstGeom prst="rect">
             <a:avLst/>
@@ -3745,13 +3773,67 @@
               </a:lnSpc>
             </a:pPr>
             <a:r>
-              <a:rPr lang="en-US" sz="1100" dirty="0">
+              <a:rPr lang="en-US" sz="6000" dirty="0">
                 <a:solidFill>
                   <a:schemeClr val="bg1"/>
                 </a:solidFill>
                 <a:latin typeface="Garamond" panose="02020404030301010803" pitchFamily="18" charset="0"/>
               </a:rPr>
-              <a:t>The Dakar Rally is an annual off-road endurance event that typically spans over two weeks and covers thousands of kilometers across challenging terrain, and the most recent rally took place in Saudi Arabia. Participants, including motorcyclists, drivers, and truckers, compete in various categories, facing extreme conditions like deserts, mountains, and dunes, making it one of the toughest motor-sport events in the world. For this investigation, we will be looking at the motorist statistics for all 12 stages of race. This dataset’s analysis will exemplify data visualization, uncovering patterns and insights within the race dynamics.</a:t>
+              <a:t>What will be learned</a:t>
+            </a:r>
+          </a:p>
+          <a:p>
+            <a:pPr marL="571500" indent="-571500">
+              <a:lnSpc>
+                <a:spcPct val="150000"/>
+              </a:lnSpc>
+              <a:buFont typeface="Arial" panose="020B0604020202020204" pitchFamily="34" charset="0"/>
+              <a:buChar char="•"/>
+            </a:pPr>
+            <a:r>
+              <a:rPr lang="en-US" sz="4000" dirty="0">
+                <a:solidFill>
+                  <a:schemeClr val="bg1"/>
+                </a:solidFill>
+                <a:latin typeface="Garamond" panose="02020404030301010803" pitchFamily="18" charset="0"/>
+              </a:rPr>
+              <a:t>For this investigation, we will be looking at the motorist statistics for all 12 stages of race</a:t>
+            </a:r>
+            <a:r>
+              <a:rPr lang="en-US" sz="4000">
+                <a:solidFill>
+                  <a:schemeClr val="bg1"/>
+                </a:solidFill>
+                <a:latin typeface="Garamond" panose="02020404030301010803" pitchFamily="18" charset="0"/>
+              </a:rPr>
+              <a:t>. </a:t>
+            </a:r>
+          </a:p>
+          <a:p>
+            <a:pPr marL="571500" indent="-571500">
+              <a:lnSpc>
+                <a:spcPct val="150000"/>
+              </a:lnSpc>
+              <a:buFont typeface="Arial" panose="020B0604020202020204" pitchFamily="34" charset="0"/>
+              <a:buChar char="•"/>
+            </a:pPr>
+            <a:r>
+              <a:rPr lang="en-US" sz="4000">
+                <a:solidFill>
+                  <a:schemeClr val="bg1"/>
+                </a:solidFill>
+                <a:latin typeface="Garamond" panose="02020404030301010803" pitchFamily="18" charset="0"/>
+              </a:rPr>
+              <a:t>This </a:t>
+            </a:r>
+            <a:r>
+              <a:rPr lang="en-US" sz="4000" dirty="0">
+                <a:solidFill>
+                  <a:schemeClr val="bg1"/>
+                </a:solidFill>
+                <a:latin typeface="Garamond" panose="02020404030301010803" pitchFamily="18" charset="0"/>
+              </a:rPr>
+              <a:t>dataset’s analysis will exemplify data visualization, uncovering patterns and insights within the race dynamics.</a:t>
             </a:r>
           </a:p>
         </p:txBody>
@@ -3882,8 +3964,8 @@
         </p:nvSpPr>
         <p:spPr>
           <a:xfrm>
-            <a:off x="1141659" y="13962238"/>
-            <a:ext cx="7511177" cy="3231654"/>
+            <a:off x="1141660" y="12539838"/>
+            <a:ext cx="7182676" cy="4062651"/>
           </a:xfrm>
           <a:prstGeom prst="rect">
             <a:avLst/>
@@ -3905,7 +3987,18 @@
                 </a:solidFill>
                 <a:latin typeface="Garamond" panose="02020404030301010803" pitchFamily="18" charset="0"/>
               </a:rPr>
-              <a:t>1. Introduction</a:t>
+              <a:t>1. </a:t>
+            </a:r>
+            <a:r>
+              <a:rPr lang="en-US" sz="4800" dirty="0">
+                <a:solidFill>
+                  <a:schemeClr val="bg1">
+                    <a:lumMod val="95000"/>
+                  </a:schemeClr>
+                </a:solidFill>
+                <a:latin typeface="Garamond" panose="02020404030301010803" pitchFamily="18" charset="0"/>
+              </a:rPr>
+              <a:t>Introduction</a:t>
             </a:r>
           </a:p>
           <a:p>
@@ -3914,7 +4007,7 @@
               <a:buChar char="•"/>
             </a:pPr>
             <a:r>
-              <a:rPr lang="en-US" sz="4000" dirty="0">
+              <a:rPr lang="en-US" sz="4200" dirty="0">
                 <a:solidFill>
                   <a:schemeClr val="bg1">
                     <a:lumMod val="95000"/>
@@ -3931,7 +4024,7 @@
               <a:buChar char="•"/>
             </a:pPr>
             <a:r>
-              <a:rPr lang="en-US" sz="4000" dirty="0">
+              <a:rPr lang="en-US" sz="4200" dirty="0">
                 <a:solidFill>
                   <a:schemeClr val="bg1">
                     <a:lumMod val="95000"/>
@@ -3958,7 +4051,7 @@
         </p:nvSpPr>
         <p:spPr>
           <a:xfrm>
-            <a:off x="3788466" y="5947802"/>
+            <a:off x="3788466" y="5846202"/>
             <a:ext cx="7714969" cy="1323439"/>
           </a:xfrm>
           <a:prstGeom prst="rect">
@@ -3998,7 +4091,7 @@
         </p:nvSpPr>
         <p:spPr>
           <a:xfrm>
-            <a:off x="3641672" y="12685799"/>
+            <a:off x="3641672" y="11110999"/>
             <a:ext cx="7877927" cy="1323439"/>
           </a:xfrm>
           <a:prstGeom prst="rect">
@@ -4046,8 +4139,8 @@
         </p:blipFill>
         <p:spPr>
           <a:xfrm>
-            <a:off x="8324335" y="14234904"/>
-            <a:ext cx="5598563" cy="5215643"/>
+            <a:off x="8005064" y="12548790"/>
+            <a:ext cx="5921393" cy="5516393"/>
           </a:xfrm>
           <a:prstGeom prst="rect">
             <a:avLst/>
@@ -4068,8 +4161,8 @@
         </p:nvSpPr>
         <p:spPr>
           <a:xfrm>
-            <a:off x="7410256" y="20335245"/>
-            <a:ext cx="7023611" cy="2616101"/>
+            <a:off x="7352167" y="19296773"/>
+            <a:ext cx="6799567" cy="2769989"/>
           </a:xfrm>
           <a:prstGeom prst="rect">
             <a:avLst/>
@@ -4091,7 +4184,18 @@
                 </a:solidFill>
                 <a:latin typeface="Garamond" panose="02020404030301010803" pitchFamily="18" charset="0"/>
               </a:rPr>
-              <a:t>2. Data</a:t>
+              <a:t>2. </a:t>
+            </a:r>
+            <a:r>
+              <a:rPr lang="en-US" sz="4800" dirty="0">
+                <a:solidFill>
+                  <a:schemeClr val="bg1">
+                    <a:lumMod val="95000"/>
+                  </a:schemeClr>
+                </a:solidFill>
+                <a:latin typeface="Garamond" panose="02020404030301010803" pitchFamily="18" charset="0"/>
+              </a:rPr>
+              <a:t>Data</a:t>
             </a:r>
           </a:p>
           <a:p>
@@ -4100,7 +4204,7 @@
               <a:buChar char="•"/>
             </a:pPr>
             <a:r>
-              <a:rPr lang="en-US" sz="4000" dirty="0">
+              <a:rPr lang="en-US" sz="4200" dirty="0">
                 <a:solidFill>
                   <a:schemeClr val="bg1">
                     <a:lumMod val="95000"/>
@@ -4108,7 +4212,7 @@
                 </a:solidFill>
                 <a:latin typeface="Garamond" panose="02020404030301010803" pitchFamily="18" charset="0"/>
               </a:rPr>
-              <a:t>Summary of dataset, including variable descriptions</a:t>
+              <a:t>Summary of dataset, with variable descriptions</a:t>
             </a:r>
           </a:p>
           <a:p>
@@ -4117,7 +4221,7 @@
               <a:buChar char="•"/>
             </a:pPr>
             <a:r>
-              <a:rPr lang="en-US" sz="4000" dirty="0">
+              <a:rPr lang="en-US" sz="4200" dirty="0">
                 <a:solidFill>
                   <a:schemeClr val="bg1">
                     <a:lumMod val="95000"/>
@@ -4125,7 +4229,18 @@
                 </a:solidFill>
                 <a:latin typeface="Garamond" panose="02020404030301010803" pitchFamily="18" charset="0"/>
               </a:rPr>
-              <a:t>Supplies data file and source </a:t>
+              <a:t>Supplies data file and source</a:t>
+            </a:r>
+            <a:r>
+              <a:rPr lang="en-US" sz="4000" dirty="0">
+                <a:solidFill>
+                  <a:schemeClr val="bg1">
+                    <a:lumMod val="95000"/>
+                  </a:schemeClr>
+                </a:solidFill>
+                <a:latin typeface="Garamond" panose="02020404030301010803" pitchFamily="18" charset="0"/>
+              </a:rPr>
+              <a:t> </a:t>
             </a:r>
           </a:p>
         </p:txBody>
@@ -4152,7 +4267,7 @@
         </p:blipFill>
         <p:spPr>
           <a:xfrm>
-            <a:off x="1191444" y="17584914"/>
+            <a:off x="1083581" y="17432481"/>
             <a:ext cx="6108896" cy="6721899"/>
           </a:xfrm>
           <a:prstGeom prst="rect">
@@ -4174,8 +4289,8 @@
         </p:nvSpPr>
         <p:spPr>
           <a:xfrm>
-            <a:off x="1374947" y="25262780"/>
-            <a:ext cx="6404979" cy="2000548"/>
+            <a:off x="1357899" y="25262443"/>
+            <a:ext cx="6799566" cy="2123658"/>
           </a:xfrm>
           <a:prstGeom prst="rect">
             <a:avLst/>
@@ -4197,7 +4312,18 @@
                 </a:solidFill>
                 <a:latin typeface="Garamond" panose="02020404030301010803" pitchFamily="18" charset="0"/>
               </a:rPr>
-              <a:t>3. Materials</a:t>
+              <a:t>3. </a:t>
+            </a:r>
+            <a:r>
+              <a:rPr lang="en-US" sz="4800" dirty="0">
+                <a:solidFill>
+                  <a:schemeClr val="bg1">
+                    <a:lumMod val="95000"/>
+                  </a:schemeClr>
+                </a:solidFill>
+                <a:latin typeface="Garamond" panose="02020404030301010803" pitchFamily="18" charset="0"/>
+              </a:rPr>
+              <a:t>Materials</a:t>
             </a:r>
           </a:p>
           <a:p>
@@ -4206,7 +4332,7 @@
               <a:buChar char="•"/>
             </a:pPr>
             <a:r>
-              <a:rPr lang="en-US" sz="4000" dirty="0">
+              <a:rPr lang="en-US" sz="4200" dirty="0">
                 <a:solidFill>
                   <a:schemeClr val="bg1">
                     <a:lumMod val="95000"/>
@@ -4240,7 +4366,7 @@
         </p:blipFill>
         <p:spPr>
           <a:xfrm>
-            <a:off x="7631435" y="23374281"/>
+            <a:off x="7783835" y="23374281"/>
             <a:ext cx="6244222" cy="7816183"/>
           </a:xfrm>
           <a:prstGeom prst="rect">
@@ -4262,8 +4388,8 @@
         </p:nvSpPr>
         <p:spPr>
           <a:xfrm>
-            <a:off x="1034980" y="28496523"/>
-            <a:ext cx="6751096" cy="2616101"/>
+            <a:off x="1083581" y="28025867"/>
+            <a:ext cx="6497055" cy="3416320"/>
           </a:xfrm>
           <a:prstGeom prst="rect">
             <a:avLst/>
@@ -4285,7 +4411,18 @@
                 </a:solidFill>
                 <a:latin typeface="Garamond" panose="02020404030301010803" pitchFamily="18" charset="0"/>
               </a:rPr>
-              <a:t>4. Conclusion</a:t>
+              <a:t>4. </a:t>
+            </a:r>
+            <a:r>
+              <a:rPr lang="en-US" sz="4800" dirty="0">
+                <a:solidFill>
+                  <a:schemeClr val="bg1">
+                    <a:lumMod val="95000"/>
+                  </a:schemeClr>
+                </a:solidFill>
+                <a:latin typeface="Garamond" panose="02020404030301010803" pitchFamily="18" charset="0"/>
+              </a:rPr>
+              <a:t>Conclusion</a:t>
             </a:r>
           </a:p>
           <a:p>
@@ -4294,7 +4431,7 @@
               <a:buChar char="•"/>
             </a:pPr>
             <a:r>
-              <a:rPr lang="en-US" sz="4000" dirty="0">
+              <a:rPr lang="en-US" sz="4200" dirty="0">
                 <a:solidFill>
                   <a:schemeClr val="bg1">
                     <a:lumMod val="95000"/>
@@ -4302,7 +4439,7 @@
                 </a:solidFill>
                 <a:latin typeface="Garamond" panose="02020404030301010803" pitchFamily="18" charset="0"/>
               </a:rPr>
-              <a:t>Summarizes the takeaways and learning objectives of sports application handouts</a:t>
+              <a:t>Summarize the takeaways and learning objectives from the sports application handouts</a:t>
             </a:r>
           </a:p>
         </p:txBody>
@@ -4329,8 +4466,8 @@
         </p:blipFill>
         <p:spPr>
           <a:xfrm>
-            <a:off x="31567120" y="7788087"/>
-            <a:ext cx="9171012" cy="6107894"/>
+            <a:off x="31277484" y="7512364"/>
+            <a:ext cx="9750284" cy="6493689"/>
           </a:xfrm>
           <a:prstGeom prst="rect">
             <a:avLst/>
@@ -4381,8 +4518,8 @@
         </p:nvSpPr>
         <p:spPr>
           <a:xfrm>
-            <a:off x="15643470" y="14213394"/>
-            <a:ext cx="6803497" cy="1200329"/>
+            <a:off x="15567980" y="13938386"/>
+            <a:ext cx="12275185" cy="5416868"/>
           </a:xfrm>
           <a:prstGeom prst="rect">
             <a:avLst/>
@@ -4396,13 +4533,58 @@
           <a:lstStyle/>
           <a:p>
             <a:r>
-              <a:rPr lang="en-US" sz="7200" dirty="0">
+              <a:rPr lang="en-US" sz="6000" dirty="0">
                 <a:solidFill>
                   <a:schemeClr val="bg1"/>
                 </a:solidFill>
                 <a:latin typeface="Garamond" panose="02020404030301010803" pitchFamily="18" charset="0"/>
               </a:rPr>
-              <a:t>What?</a:t>
+              <a:t>What is it?</a:t>
+            </a:r>
+          </a:p>
+          <a:p>
+            <a:pPr marL="571500" indent="-571500">
+              <a:buFont typeface="Arial" panose="020B0604020202020204" pitchFamily="34" charset="0"/>
+              <a:buChar char="•"/>
+            </a:pPr>
+            <a:r>
+              <a:rPr lang="en-US" sz="4000" dirty="0">
+                <a:solidFill>
+                  <a:schemeClr val="bg1"/>
+                </a:solidFill>
+                <a:latin typeface="Garamond" panose="02020404030301010803" pitchFamily="18" charset="0"/>
+              </a:rPr>
+              <a:t> Sport that requires a unique combination of skill, strength, and courage </a:t>
+            </a:r>
+          </a:p>
+          <a:p>
+            <a:pPr marL="571500" indent="-571500">
+              <a:buFont typeface="Arial" panose="020B0604020202020204" pitchFamily="34" charset="0"/>
+              <a:buChar char="•"/>
+            </a:pPr>
+            <a:r>
+              <a:rPr lang="en-US" sz="4000" dirty="0">
+                <a:solidFill>
+                  <a:schemeClr val="bg1"/>
+                </a:solidFill>
+                <a:latin typeface="Garamond" panose="02020404030301010803" pitchFamily="18" charset="0"/>
+              </a:rPr>
+              <a:t>Riders must stay on a bucking bull as long as they can, using only one hand to hold on while the bull tries to throw them off. </a:t>
+            </a:r>
+          </a:p>
+          <a:p>
+            <a:pPr marL="571500" indent="-571500">
+              <a:buFont typeface="Arial" panose="020B0604020202020204" pitchFamily="34" charset="0"/>
+              <a:buChar char="•"/>
+            </a:pPr>
+            <a:r>
+              <a:rPr lang="en-US" sz="4000" dirty="0">
+                <a:solidFill>
+                  <a:schemeClr val="bg1"/>
+                </a:solidFill>
+                <a:latin typeface="Garamond" panose="02020404030301010803" pitchFamily="18" charset="0"/>
+              </a:rPr>
+              <a:t>Score based on their performance, and the bull is also scored based on how well it bucks. </a:t>
             </a:r>
           </a:p>
         </p:txBody>
@@ -4421,8 +4603,8 @@
         </p:nvSpPr>
         <p:spPr>
           <a:xfrm>
-            <a:off x="29917040" y="14213394"/>
-            <a:ext cx="6803497" cy="1200329"/>
+            <a:off x="29743835" y="14328045"/>
+            <a:ext cx="12789765" cy="6032421"/>
           </a:xfrm>
           <a:prstGeom prst="rect">
             <a:avLst/>
@@ -4436,13 +4618,43 @@
           <a:lstStyle/>
           <a:p>
             <a:r>
-              <a:rPr lang="en-US" sz="7200" dirty="0">
+              <a:rPr lang="en-US" sz="6000" dirty="0">
                 <a:solidFill>
                   <a:schemeClr val="bg1"/>
                 </a:solidFill>
                 <a:latin typeface="Garamond" panose="02020404030301010803" pitchFamily="18" charset="0"/>
               </a:rPr>
-              <a:t>What?</a:t>
+              <a:t>What is it?</a:t>
+            </a:r>
+          </a:p>
+          <a:p>
+            <a:pPr marL="571500" indent="-571500">
+              <a:buFont typeface="Arial" panose="020B0604020202020204" pitchFamily="34" charset="0"/>
+              <a:buChar char="•"/>
+            </a:pPr>
+            <a:r>
+              <a:rPr lang="en-US" sz="4000" dirty="0">
+                <a:solidFill>
+                  <a:schemeClr val="bg1"/>
+                </a:solidFill>
+                <a:latin typeface="Garamond" panose="02020404030301010803" pitchFamily="18" charset="0"/>
+              </a:rPr>
+              <a:t>Annual off-road endurance event that typically spans over two weeks and covers thousands of kilometers across challenging terrain, and the most recent rally took place in Saudi Arabia. </a:t>
+            </a:r>
+          </a:p>
+          <a:p>
+            <a:pPr marL="571500" indent="-571500">
+              <a:buFont typeface="Arial" panose="020B0604020202020204" pitchFamily="34" charset="0"/>
+              <a:buChar char="•"/>
+            </a:pPr>
+            <a:r>
+              <a:rPr lang="en-US" sz="4000" dirty="0">
+                <a:solidFill>
+                  <a:schemeClr val="bg1"/>
+                </a:solidFill>
+                <a:latin typeface="Garamond" panose="02020404030301010803" pitchFamily="18" charset="0"/>
+              </a:rPr>
+              <a:t>Participants, including motorcyclists, drivers, and truckers, compete in various categories, facing extreme conditions like deserts, mountains, and dunes, making it one of the toughest motor-sport events in the world.</a:t>
             </a:r>
           </a:p>
         </p:txBody>

</xml_diff>

<commit_message>
updating modle section on poster
</commit_message>
<xml_diff>
--- a/mjmaslow/SYE_Poster_Maslow.pptx
+++ b/mjmaslow/SYE_Poster_Maslow.pptx
@@ -3584,7 +3584,7 @@
         <p:spPr>
           <a:xfrm>
             <a:off x="1191444" y="7409334"/>
-            <a:ext cx="13018379" cy="3416320"/>
+            <a:ext cx="13018379" cy="1938992"/>
           </a:xfrm>
           <a:prstGeom prst="rect">
             <a:avLst/>
@@ -3602,7 +3602,7 @@
               <a:buChar char="•"/>
             </a:pPr>
             <a:r>
-              <a:rPr lang="en-US" sz="5400" dirty="0">
+              <a:rPr lang="en-US" sz="4000" dirty="0">
                 <a:solidFill>
                   <a:schemeClr val="bg1"/>
                 </a:solidFill>
@@ -3617,7 +3617,7 @@
               <a:buChar char="•"/>
             </a:pPr>
             <a:r>
-              <a:rPr lang="en-US" sz="5400" dirty="0">
+              <a:rPr lang="en-US" sz="4000" dirty="0">
                 <a:solidFill>
                   <a:schemeClr val="bg1"/>
                 </a:solidFill>
@@ -3642,8 +3642,8 @@
         </p:nvSpPr>
         <p:spPr>
           <a:xfrm>
-            <a:off x="15643470" y="19677246"/>
-            <a:ext cx="12619772" cy="7853817"/>
+            <a:off x="15643470" y="23726727"/>
+            <a:ext cx="12619772" cy="5355312"/>
           </a:xfrm>
           <a:prstGeom prst="rect">
             <a:avLst/>
@@ -3673,14 +3673,11 @@
           </a:p>
           <a:p>
             <a:pPr marL="571500" indent="-571500">
-              <a:lnSpc>
-                <a:spcPct val="150000"/>
-              </a:lnSpc>
               <a:buFont typeface="Arial" panose="020B0604020202020204" pitchFamily="34" charset="0"/>
               <a:buChar char="•"/>
             </a:pPr>
             <a:r>
-              <a:rPr lang="en-US" sz="4000" dirty="0">
+              <a:rPr lang="en-US" sz="3600" dirty="0">
                 <a:solidFill>
                   <a:schemeClr val="bg1"/>
                 </a:solidFill>
@@ -3691,14 +3688,11 @@
           </a:p>
           <a:p>
             <a:pPr marL="571500" indent="-571500">
-              <a:lnSpc>
-                <a:spcPct val="150000"/>
-              </a:lnSpc>
               <a:buFont typeface="Arial" panose="020B0604020202020204" pitchFamily="34" charset="0"/>
               <a:buChar char="•"/>
             </a:pPr>
             <a:r>
-              <a:rPr lang="en-US" sz="4000" dirty="0">
+              <a:rPr lang="en-US" sz="3600" dirty="0">
                 <a:solidFill>
                   <a:schemeClr val="bg1"/>
                 </a:solidFill>
@@ -3753,8 +3747,8 @@
         </p:nvSpPr>
         <p:spPr>
           <a:xfrm>
-            <a:off x="29607150" y="22007053"/>
-            <a:ext cx="13108359" cy="5083828"/>
+            <a:off x="30001124" y="25067864"/>
+            <a:ext cx="12275186" cy="3693319"/>
           </a:xfrm>
           <a:prstGeom prst="rect">
             <a:avLst/>
@@ -3784,56 +3778,32 @@
           </a:p>
           <a:p>
             <a:pPr marL="571500" indent="-571500">
-              <a:lnSpc>
-                <a:spcPct val="150000"/>
-              </a:lnSpc>
               <a:buFont typeface="Arial" panose="020B0604020202020204" pitchFamily="34" charset="0"/>
               <a:buChar char="•"/>
             </a:pPr>
             <a:r>
-              <a:rPr lang="en-US" sz="4000" dirty="0">
+              <a:rPr lang="en-US" sz="3600" dirty="0">
                 <a:solidFill>
                   <a:schemeClr val="bg1"/>
                 </a:solidFill>
                 <a:latin typeface="Garamond" panose="02020404030301010803" pitchFamily="18" charset="0"/>
               </a:rPr>
-              <a:t>For this investigation, we will be looking at the motorist statistics for all 12 stages of race</a:t>
-            </a:r>
-            <a:r>
-              <a:rPr lang="en-US" sz="4000">
-                <a:solidFill>
-                  <a:schemeClr val="bg1"/>
-                </a:solidFill>
-                <a:latin typeface="Garamond" panose="02020404030301010803" pitchFamily="18" charset="0"/>
-              </a:rPr>
-              <a:t>. </a:t>
+              <a:t>For this investigation, we will be looking at the motorist statistics for all 12 stages of race. </a:t>
             </a:r>
           </a:p>
           <a:p>
             <a:pPr marL="571500" indent="-571500">
-              <a:lnSpc>
-                <a:spcPct val="150000"/>
-              </a:lnSpc>
               <a:buFont typeface="Arial" panose="020B0604020202020204" pitchFamily="34" charset="0"/>
               <a:buChar char="•"/>
             </a:pPr>
             <a:r>
-              <a:rPr lang="en-US" sz="4000">
+              <a:rPr lang="en-US" sz="3600" dirty="0">
                 <a:solidFill>
                   <a:schemeClr val="bg1"/>
                 </a:solidFill>
                 <a:latin typeface="Garamond" panose="02020404030301010803" pitchFamily="18" charset="0"/>
               </a:rPr>
-              <a:t>This </a:t>
-            </a:r>
-            <a:r>
-              <a:rPr lang="en-US" sz="4000" dirty="0">
-                <a:solidFill>
-                  <a:schemeClr val="bg1"/>
-                </a:solidFill>
-                <a:latin typeface="Garamond" panose="02020404030301010803" pitchFamily="18" charset="0"/>
-              </a:rPr>
-              <a:t>dataset’s analysis will exemplify data visualization, uncovering patterns and insights within the race dynamics.</a:t>
+              <a:t>This dataset’s analysis will exemplify data visualization, uncovering patterns and insights within the race dynamics.</a:t>
             </a:r>
           </a:p>
         </p:txBody>
@@ -3883,7 +3853,7 @@
         <p:spPr>
           <a:xfrm>
             <a:off x="31675256" y="6003876"/>
-            <a:ext cx="9171012" cy="1323439"/>
+            <a:ext cx="9171012" cy="1107996"/>
           </a:xfrm>
           <a:prstGeom prst="rect">
             <a:avLst/>
@@ -3897,7 +3867,7 @@
           <a:lstStyle/>
           <a:p>
             <a:r>
-              <a:rPr lang="en-US" sz="8000" dirty="0">
+              <a:rPr lang="en-US" sz="6600" dirty="0">
                 <a:solidFill>
                   <a:schemeClr val="bg1"/>
                 </a:solidFill>
@@ -3905,7 +3875,7 @@
               </a:rPr>
               <a:t>The 2024 Dakar Rally</a:t>
             </a:r>
-            <a:endParaRPr lang="en-US" dirty="0"/>
+            <a:endParaRPr lang="en-US" sz="6600" dirty="0"/>
           </a:p>
         </p:txBody>
       </p:sp>
@@ -3924,7 +3894,7 @@
         <p:spPr>
           <a:xfrm>
             <a:off x="16998891" y="6003876"/>
-            <a:ext cx="9908930" cy="1323439"/>
+            <a:ext cx="9908930" cy="1107996"/>
           </a:xfrm>
           <a:prstGeom prst="rect">
             <a:avLst/>
@@ -3938,7 +3908,7 @@
           <a:lstStyle/>
           <a:p>
             <a:r>
-              <a:rPr lang="en-US" sz="8000" dirty="0">
+              <a:rPr lang="en-US" sz="6600" dirty="0">
                 <a:solidFill>
                   <a:schemeClr val="bg1"/>
                 </a:solidFill>
@@ -3946,7 +3916,7 @@
               </a:rPr>
               <a:t>Professional Bull Riding</a:t>
             </a:r>
-            <a:endParaRPr lang="en-US" dirty="0"/>
+            <a:endParaRPr lang="en-US" sz="6600" dirty="0"/>
           </a:p>
         </p:txBody>
       </p:sp>
@@ -3964,8 +3934,8 @@
         </p:nvSpPr>
         <p:spPr>
           <a:xfrm>
-            <a:off x="1141660" y="12539838"/>
-            <a:ext cx="7182676" cy="4062651"/>
+            <a:off x="1192460" y="12235038"/>
+            <a:ext cx="6159707" cy="3539430"/>
           </a:xfrm>
           <a:prstGeom prst="rect">
             <a:avLst/>
@@ -3990,7 +3960,7 @@
               <a:t>1. </a:t>
             </a:r>
             <a:r>
-              <a:rPr lang="en-US" sz="4800" dirty="0">
+              <a:rPr lang="en-US" sz="4000" dirty="0">
                 <a:solidFill>
                   <a:schemeClr val="bg1">
                     <a:lumMod val="95000"/>
@@ -4007,7 +3977,7 @@
               <a:buChar char="•"/>
             </a:pPr>
             <a:r>
-              <a:rPr lang="en-US" sz="4200" dirty="0">
+              <a:rPr lang="en-US" sz="3600" dirty="0">
                 <a:solidFill>
                   <a:schemeClr val="bg1">
                     <a:lumMod val="95000"/>
@@ -4024,7 +3994,7 @@
               <a:buChar char="•"/>
             </a:pPr>
             <a:r>
-              <a:rPr lang="en-US" sz="4200" dirty="0">
+              <a:rPr lang="en-US" sz="3600" dirty="0">
                 <a:solidFill>
                   <a:schemeClr val="bg1">
                     <a:lumMod val="95000"/>
@@ -4052,7 +4022,7 @@
         <p:spPr>
           <a:xfrm>
             <a:off x="3788466" y="5846202"/>
-            <a:ext cx="7714969" cy="1323439"/>
+            <a:ext cx="7714969" cy="1107996"/>
           </a:xfrm>
           <a:prstGeom prst="rect">
             <a:avLst/>
@@ -4066,7 +4036,7 @@
           <a:lstStyle/>
           <a:p>
             <a:r>
-              <a:rPr lang="en-US" sz="8000" dirty="0">
+              <a:rPr lang="en-US" sz="6600" dirty="0">
                 <a:solidFill>
                   <a:schemeClr val="bg1"/>
                 </a:solidFill>
@@ -4091,8 +4061,8 @@
         </p:nvSpPr>
         <p:spPr>
           <a:xfrm>
-            <a:off x="3641672" y="11110999"/>
-            <a:ext cx="7877927" cy="1323439"/>
+            <a:off x="3641672" y="9942599"/>
+            <a:ext cx="7877927" cy="1107996"/>
           </a:xfrm>
           <a:prstGeom prst="rect">
             <a:avLst/>
@@ -4106,7 +4076,7 @@
           <a:lstStyle/>
           <a:p>
             <a:r>
-              <a:rPr lang="en-US" sz="8000" dirty="0">
+              <a:rPr lang="en-US" sz="6600" dirty="0">
                 <a:solidFill>
                   <a:schemeClr val="bg1"/>
                 </a:solidFill>
@@ -4139,8 +4109,8 @@
         </p:blipFill>
         <p:spPr>
           <a:xfrm>
-            <a:off x="8005064" y="12548790"/>
-            <a:ext cx="5921393" cy="5516393"/>
+            <a:off x="7192476" y="11275288"/>
+            <a:ext cx="6629433" cy="6176005"/>
           </a:xfrm>
           <a:prstGeom prst="rect">
             <a:avLst/>
@@ -4161,8 +4131,8 @@
         </p:nvSpPr>
         <p:spPr>
           <a:xfrm>
-            <a:off x="7352167" y="19296773"/>
-            <a:ext cx="6799567" cy="2769989"/>
+            <a:off x="7865413" y="19358067"/>
+            <a:ext cx="6108897" cy="2554545"/>
           </a:xfrm>
           <a:prstGeom prst="rect">
             <a:avLst/>
@@ -4187,7 +4157,7 @@
               <a:t>2. </a:t>
             </a:r>
             <a:r>
-              <a:rPr lang="en-US" sz="4800" dirty="0">
+              <a:rPr lang="en-US" sz="4000" dirty="0">
                 <a:solidFill>
                   <a:schemeClr val="bg1">
                     <a:lumMod val="95000"/>
@@ -4204,7 +4174,7 @@
               <a:buChar char="•"/>
             </a:pPr>
             <a:r>
-              <a:rPr lang="en-US" sz="4200" dirty="0">
+              <a:rPr lang="en-US" sz="3600" dirty="0">
                 <a:solidFill>
                   <a:schemeClr val="bg1">
                     <a:lumMod val="95000"/>
@@ -4221,7 +4191,7 @@
               <a:buChar char="•"/>
             </a:pPr>
             <a:r>
-              <a:rPr lang="en-US" sz="4200" dirty="0">
+              <a:rPr lang="en-US" sz="3600" dirty="0">
                 <a:solidFill>
                   <a:schemeClr val="bg1">
                     <a:lumMod val="95000"/>
@@ -4267,8 +4237,8 @@
         </p:blipFill>
         <p:spPr>
           <a:xfrm>
-            <a:off x="1083581" y="17432481"/>
-            <a:ext cx="6108896" cy="6721899"/>
+            <a:off x="1083581" y="17614973"/>
+            <a:ext cx="6497054" cy="7149007"/>
           </a:xfrm>
           <a:prstGeom prst="rect">
             <a:avLst/>
@@ -4289,8 +4259,8 @@
         </p:nvSpPr>
         <p:spPr>
           <a:xfrm>
-            <a:off x="1357899" y="25262443"/>
-            <a:ext cx="6799566" cy="2123658"/>
+            <a:off x="1091374" y="25780097"/>
+            <a:ext cx="6799566" cy="1323439"/>
           </a:xfrm>
           <a:prstGeom prst="rect">
             <a:avLst/>
@@ -4315,7 +4285,7 @@
               <a:t>3. </a:t>
             </a:r>
             <a:r>
-              <a:rPr lang="en-US" sz="4800" dirty="0">
+              <a:rPr lang="en-US" sz="4000" dirty="0">
                 <a:solidFill>
                   <a:schemeClr val="bg1">
                     <a:lumMod val="95000"/>
@@ -4332,7 +4302,7 @@
               <a:buChar char="•"/>
             </a:pPr>
             <a:r>
-              <a:rPr lang="en-US" sz="4200" dirty="0">
+              <a:rPr lang="en-US" sz="3600" dirty="0">
                 <a:solidFill>
                   <a:schemeClr val="bg1">
                     <a:lumMod val="95000"/>
@@ -4366,7 +4336,7 @@
         </p:blipFill>
         <p:spPr>
           <a:xfrm>
-            <a:off x="7783835" y="23374281"/>
+            <a:off x="7769321" y="23679081"/>
             <a:ext cx="6244222" cy="7816183"/>
           </a:xfrm>
           <a:prstGeom prst="rect">
@@ -4388,8 +4358,8 @@
         </p:nvSpPr>
         <p:spPr>
           <a:xfrm>
-            <a:off x="1083581" y="28025867"/>
-            <a:ext cx="6497055" cy="3416320"/>
+            <a:off x="1083581" y="28432267"/>
+            <a:ext cx="6497055" cy="2492990"/>
           </a:xfrm>
           <a:prstGeom prst="rect">
             <a:avLst/>
@@ -4414,7 +4384,7 @@
               <a:t>4. </a:t>
             </a:r>
             <a:r>
-              <a:rPr lang="en-US" sz="4800" dirty="0">
+              <a:rPr lang="en-US" sz="4000" dirty="0">
                 <a:solidFill>
                   <a:schemeClr val="bg1">
                     <a:lumMod val="95000"/>
@@ -4431,7 +4401,7 @@
               <a:buChar char="•"/>
             </a:pPr>
             <a:r>
-              <a:rPr lang="en-US" sz="4200" dirty="0">
+              <a:rPr lang="en-US" sz="3600" dirty="0">
                 <a:solidFill>
                   <a:schemeClr val="bg1">
                     <a:lumMod val="95000"/>
@@ -4519,7 +4489,7 @@
         <p:spPr>
           <a:xfrm>
             <a:off x="15567980" y="13938386"/>
-            <a:ext cx="12275185" cy="5416868"/>
+            <a:ext cx="12275185" cy="4493538"/>
           </a:xfrm>
           <a:prstGeom prst="rect">
             <a:avLst/>
@@ -4554,7 +4524,16 @@
                 </a:solidFill>
                 <a:latin typeface="Garamond" panose="02020404030301010803" pitchFamily="18" charset="0"/>
               </a:rPr>
-              <a:t> Sport that requires a unique combination of skill, strength, and courage </a:t>
+              <a:t> </a:t>
+            </a:r>
+            <a:r>
+              <a:rPr lang="en-US" sz="3600" dirty="0">
+                <a:solidFill>
+                  <a:schemeClr val="bg1"/>
+                </a:solidFill>
+                <a:latin typeface="Garamond" panose="02020404030301010803" pitchFamily="18" charset="0"/>
+              </a:rPr>
+              <a:t>Sport that requires a unique combination of skill, strength, and courage </a:t>
             </a:r>
           </a:p>
           <a:p>
@@ -4563,7 +4542,7 @@
               <a:buChar char="•"/>
             </a:pPr>
             <a:r>
-              <a:rPr lang="en-US" sz="4000" dirty="0">
+              <a:rPr lang="en-US" sz="3600" dirty="0">
                 <a:solidFill>
                   <a:schemeClr val="bg1"/>
                 </a:solidFill>
@@ -4578,7 +4557,7 @@
               <a:buChar char="•"/>
             </a:pPr>
             <a:r>
-              <a:rPr lang="en-US" sz="4000" dirty="0">
+              <a:rPr lang="en-US" sz="3600" dirty="0">
                 <a:solidFill>
                   <a:schemeClr val="bg1"/>
                 </a:solidFill>

</xml_diff>

<commit_message>
more updates to poster
</commit_message>
<xml_diff>
--- a/mjmaslow/SYE_Poster_Maslow.pptx
+++ b/mjmaslow/SYE_Poster_Maslow.pptx
@@ -3642,7 +3642,7 @@
         </p:nvSpPr>
         <p:spPr>
           <a:xfrm>
-            <a:off x="15643470" y="23726727"/>
+            <a:off x="15643470" y="24691927"/>
             <a:ext cx="12619772" cy="5355312"/>
           </a:xfrm>
           <a:prstGeom prst="rect">
@@ -3725,8 +3725,8 @@
         </p:blipFill>
         <p:spPr>
           <a:xfrm>
-            <a:off x="20063910" y="29174135"/>
-            <a:ext cx="3713576" cy="2291808"/>
+            <a:off x="20611758" y="30102085"/>
+            <a:ext cx="2667684" cy="1646343"/>
           </a:xfrm>
           <a:prstGeom prst="rect">
             <a:avLst/>
@@ -3747,7 +3747,7 @@
         </p:nvSpPr>
         <p:spPr>
           <a:xfrm>
-            <a:off x="30001124" y="25067864"/>
+            <a:off x="30001124" y="25931464"/>
             <a:ext cx="12275186" cy="3693319"/>
           </a:xfrm>
           <a:prstGeom prst="rect">
@@ -3830,8 +3830,8 @@
         </p:blipFill>
         <p:spPr>
           <a:xfrm>
-            <a:off x="34543838" y="29346767"/>
-            <a:ext cx="3433849" cy="2119176"/>
+            <a:off x="34926919" y="30102084"/>
+            <a:ext cx="2667686" cy="1646344"/>
           </a:xfrm>
           <a:prstGeom prst="rect">
             <a:avLst/>
@@ -3866,6 +3866,7 @@
           </a:bodyPr>
           <a:lstStyle/>
           <a:p>
+            <a:pPr algn="ctr"/>
             <a:r>
               <a:rPr lang="en-US" sz="6600" dirty="0">
                 <a:solidFill>
@@ -3907,6 +3908,7 @@
           </a:bodyPr>
           <a:lstStyle/>
           <a:p>
+            <a:pPr algn="ctr"/>
             <a:r>
               <a:rPr lang="en-US" sz="6600" dirty="0">
                 <a:solidFill>
@@ -4436,7 +4438,7 @@
         </p:blipFill>
         <p:spPr>
           <a:xfrm>
-            <a:off x="31277484" y="7512364"/>
+            <a:off x="31277484" y="7410764"/>
             <a:ext cx="9750284" cy="6493689"/>
           </a:xfrm>
           <a:prstGeom prst="rect">
@@ -4488,7 +4490,7 @@
         </p:nvSpPr>
         <p:spPr>
           <a:xfrm>
-            <a:off x="15567980" y="13938386"/>
+            <a:off x="15567980" y="13989186"/>
             <a:ext cx="12275185" cy="4493538"/>
           </a:xfrm>
           <a:prstGeom prst="rect">
@@ -4582,7 +4584,7 @@
         </p:nvSpPr>
         <p:spPr>
           <a:xfrm>
-            <a:off x="29743835" y="14328045"/>
+            <a:off x="29845435" y="14124845"/>
             <a:ext cx="12789765" cy="6032421"/>
           </a:xfrm>
           <a:prstGeom prst="rect">
@@ -4638,6 +4640,111 @@
           </a:p>
         </p:txBody>
       </p:sp>
+      <p:sp>
+        <p:nvSpPr>
+          <p:cNvPr id="3" name="AutoShape 4">
+            <a:extLst>
+              <a:ext uri="{FF2B5EF4-FFF2-40B4-BE49-F238E27FC236}">
+                <a16:creationId xmlns:a16="http://schemas.microsoft.com/office/drawing/2014/main" id="{84B39A4E-AAD8-4A91-F0FE-2446AA0DAE5B}"/>
+              </a:ext>
+            </a:extLst>
+          </p:cNvPr>
+          <p:cNvSpPr>
+            <a:spLocks noChangeAspect="1" noChangeArrowheads="1"/>
+          </p:cNvSpPr>
+          <p:nvPr/>
+        </p:nvSpPr>
+        <p:spPr bwMode="auto">
+          <a:xfrm>
+            <a:off x="21520039" y="18999177"/>
+            <a:ext cx="2845203" cy="2845203"/>
+          </a:xfrm>
+          <a:prstGeom prst="rect">
+            <a:avLst/>
+          </a:prstGeom>
+          <a:noFill/>
+          <a:extLst>
+            <a:ext uri="{909E8E84-426E-40DD-AFC4-6F175D3DCCD1}">
+              <a14:hiddenFill xmlns:a14="http://schemas.microsoft.com/office/drawing/2010/main">
+                <a:solidFill>
+                  <a:srgbClr val="FFFFFF"/>
+                </a:solidFill>
+              </a14:hiddenFill>
+            </a:ext>
+          </a:extLst>
+        </p:spPr>
+        <p:txBody>
+          <a:bodyPr vert="horz" wrap="square" lIns="91440" tIns="45720" rIns="91440" bIns="45720" numCol="1" anchor="t" anchorCtr="0" compatLnSpc="1">
+            <a:prstTxWarp prst="textNoShape">
+              <a:avLst/>
+            </a:prstTxWarp>
+          </a:bodyPr>
+          <a:lstStyle/>
+          <a:p>
+            <a:endParaRPr lang="en-US"/>
+          </a:p>
+        </p:txBody>
+      </p:sp>
+      <p:pic>
+        <p:nvPicPr>
+          <p:cNvPr id="20" name="Picture 19" descr="A graph with a line and a blue line&#10;&#10;Description automatically generated">
+            <a:extLst>
+              <a:ext uri="{FF2B5EF4-FFF2-40B4-BE49-F238E27FC236}">
+                <a16:creationId xmlns:a16="http://schemas.microsoft.com/office/drawing/2014/main" id="{5E3342D5-8D7E-81C3-BE31-4FD31D35937C}"/>
+              </a:ext>
+            </a:extLst>
+          </p:cNvPr>
+          <p:cNvPicPr>
+            <a:picLocks noChangeAspect="1"/>
+          </p:cNvPicPr>
+          <p:nvPr/>
+        </p:nvPicPr>
+        <p:blipFill>
+          <a:blip r:embed="rId11"/>
+          <a:stretch>
+            <a:fillRect/>
+          </a:stretch>
+        </p:blipFill>
+        <p:spPr>
+          <a:xfrm>
+            <a:off x="17079589" y="18782355"/>
+            <a:ext cx="9531260" cy="5882149"/>
+          </a:xfrm>
+          <a:prstGeom prst="rect">
+            <a:avLst/>
+          </a:prstGeom>
+        </p:spPr>
+      </p:pic>
+      <p:pic>
+        <p:nvPicPr>
+          <p:cNvPr id="29" name="Picture 28" descr="A graph with a line and dots&#10;&#10;Description automatically generated">
+            <a:extLst>
+              <a:ext uri="{FF2B5EF4-FFF2-40B4-BE49-F238E27FC236}">
+                <a16:creationId xmlns:a16="http://schemas.microsoft.com/office/drawing/2014/main" id="{BD2485F5-CA46-0342-D881-DBC6D16C3FCD}"/>
+              </a:ext>
+            </a:extLst>
+          </p:cNvPr>
+          <p:cNvPicPr>
+            <a:picLocks noChangeAspect="1"/>
+          </p:cNvPicPr>
+          <p:nvPr/>
+        </p:nvPicPr>
+        <p:blipFill>
+          <a:blip r:embed="rId12"/>
+          <a:stretch>
+            <a:fillRect/>
+          </a:stretch>
+        </p:blipFill>
+        <p:spPr>
+          <a:xfrm>
+            <a:off x="31563923" y="20261058"/>
+            <a:ext cx="9352788" cy="5772006"/>
+          </a:xfrm>
+          <a:prstGeom prst="rect">
+            <a:avLst/>
+          </a:prstGeom>
+        </p:spPr>
+      </p:pic>
     </p:spTree>
     <p:extLst>
       <p:ext uri="{BB962C8B-B14F-4D97-AF65-F5344CB8AC3E}">

</xml_diff>

<commit_message>
fixing bit of poster
</commit_message>
<xml_diff>
--- a/mjmaslow/SYE_Poster_Maslow.pptx
+++ b/mjmaslow/SYE_Poster_Maslow.pptx
@@ -306,7 +306,7 @@
           <a:p>
             <a:fld id="{2DC29746-1088-C241-BC8C-4CC03DF23E15}" type="datetimeFigureOut">
               <a:rPr lang="en-US" smtClean="0"/>
-              <a:t>4/15/24</a:t>
+              <a:t>4/16/24</a:t>
             </a:fld>
             <a:endParaRPr lang="en-US"/>
           </a:p>
@@ -476,7 +476,7 @@
           <a:p>
             <a:fld id="{2DC29746-1088-C241-BC8C-4CC03DF23E15}" type="datetimeFigureOut">
               <a:rPr lang="en-US" smtClean="0"/>
-              <a:t>4/15/24</a:t>
+              <a:t>4/16/24</a:t>
             </a:fld>
             <a:endParaRPr lang="en-US"/>
           </a:p>
@@ -656,7 +656,7 @@
           <a:p>
             <a:fld id="{2DC29746-1088-C241-BC8C-4CC03DF23E15}" type="datetimeFigureOut">
               <a:rPr lang="en-US" smtClean="0"/>
-              <a:t>4/15/24</a:t>
+              <a:t>4/16/24</a:t>
             </a:fld>
             <a:endParaRPr lang="en-US"/>
           </a:p>
@@ -826,7 +826,7 @@
           <a:p>
             <a:fld id="{2DC29746-1088-C241-BC8C-4CC03DF23E15}" type="datetimeFigureOut">
               <a:rPr lang="en-US" smtClean="0"/>
-              <a:t>4/15/24</a:t>
+              <a:t>4/16/24</a:t>
             </a:fld>
             <a:endParaRPr lang="en-US"/>
           </a:p>
@@ -1070,7 +1070,7 @@
           <a:p>
             <a:fld id="{2DC29746-1088-C241-BC8C-4CC03DF23E15}" type="datetimeFigureOut">
               <a:rPr lang="en-US" smtClean="0"/>
-              <a:t>4/15/24</a:t>
+              <a:t>4/16/24</a:t>
             </a:fld>
             <a:endParaRPr lang="en-US"/>
           </a:p>
@@ -1302,7 +1302,7 @@
           <a:p>
             <a:fld id="{2DC29746-1088-C241-BC8C-4CC03DF23E15}" type="datetimeFigureOut">
               <a:rPr lang="en-US" smtClean="0"/>
-              <a:t>4/15/24</a:t>
+              <a:t>4/16/24</a:t>
             </a:fld>
             <a:endParaRPr lang="en-US"/>
           </a:p>
@@ -1669,7 +1669,7 @@
           <a:p>
             <a:fld id="{2DC29746-1088-C241-BC8C-4CC03DF23E15}" type="datetimeFigureOut">
               <a:rPr lang="en-US" smtClean="0"/>
-              <a:t>4/15/24</a:t>
+              <a:t>4/16/24</a:t>
             </a:fld>
             <a:endParaRPr lang="en-US"/>
           </a:p>
@@ -1787,7 +1787,7 @@
           <a:p>
             <a:fld id="{2DC29746-1088-C241-BC8C-4CC03DF23E15}" type="datetimeFigureOut">
               <a:rPr lang="en-US" smtClean="0"/>
-              <a:t>4/15/24</a:t>
+              <a:t>4/16/24</a:t>
             </a:fld>
             <a:endParaRPr lang="en-US"/>
           </a:p>
@@ -1882,7 +1882,7 @@
           <a:p>
             <a:fld id="{2DC29746-1088-C241-BC8C-4CC03DF23E15}" type="datetimeFigureOut">
               <a:rPr lang="en-US" smtClean="0"/>
-              <a:t>4/15/24</a:t>
+              <a:t>4/16/24</a:t>
             </a:fld>
             <a:endParaRPr lang="en-US"/>
           </a:p>
@@ -2159,7 +2159,7 @@
           <a:p>
             <a:fld id="{2DC29746-1088-C241-BC8C-4CC03DF23E15}" type="datetimeFigureOut">
               <a:rPr lang="en-US" smtClean="0"/>
-              <a:t>4/15/24</a:t>
+              <a:t>4/16/24</a:t>
             </a:fld>
             <a:endParaRPr lang="en-US"/>
           </a:p>
@@ -2416,7 +2416,7 @@
           <a:p>
             <a:fld id="{2DC29746-1088-C241-BC8C-4CC03DF23E15}" type="datetimeFigureOut">
               <a:rPr lang="en-US" smtClean="0"/>
-              <a:t>4/15/24</a:t>
+              <a:t>4/16/24</a:t>
             </a:fld>
             <a:endParaRPr lang="en-US"/>
           </a:p>
@@ -2629,7 +2629,7 @@
           <a:p>
             <a:fld id="{2DC29746-1088-C241-BC8C-4CC03DF23E15}" type="datetimeFigureOut">
               <a:rPr lang="en-US" smtClean="0"/>
-              <a:t>4/15/24</a:t>
+              <a:t>4/16/24</a:t>
             </a:fld>
             <a:endParaRPr lang="en-US"/>
           </a:p>
@@ -3479,7 +3479,7 @@
                 <a:latin typeface="Garamond" panose="02020404030301010803" pitchFamily="18" charset="0"/>
                 <a:cs typeface="Times New Roman" panose="02020603050405020304" pitchFamily="18" charset="0"/>
               </a:rPr>
-              <a:t>Matthew Maslow (Data Science)</a:t>
+              <a:t>Matthew Maslow ’24 (Data Science)</a:t>
             </a:r>
           </a:p>
           <a:p>
@@ -3531,7 +3531,7 @@
         </p:blipFill>
         <p:spPr>
           <a:xfrm>
-            <a:off x="36260763" y="-2122717"/>
+            <a:off x="36228088" y="-953120"/>
             <a:ext cx="7511177" cy="9720347"/>
           </a:xfrm>
           <a:prstGeom prst="rect">
@@ -3608,7 +3608,28 @@
                 </a:solidFill>
                 <a:latin typeface="Garamond" panose="02020404030301010803" pitchFamily="18" charset="0"/>
               </a:rPr>
-              <a:t>Funded by the National Science Foundation</a:t>
+              <a:t>Funded by the National Science Foundation (</a:t>
+            </a:r>
+            <a:r>
+              <a:rPr lang="en-US" sz="3600" b="0" dirty="0">
+                <a:solidFill>
+                  <a:schemeClr val="bg1">
+                    <a:lumMod val="95000"/>
+                  </a:schemeClr>
+                </a:solidFill>
+                <a:effectLst/>
+                <a:latin typeface="Garamond" panose="02020404030301010803" pitchFamily="18" charset="0"/>
+              </a:rPr>
+              <a:t>award 2142705</a:t>
+            </a:r>
+            <a:r>
+              <a:rPr lang="en-US" sz="4000" dirty="0">
+                <a:solidFill>
+                  <a:schemeClr val="bg1"/>
+                </a:solidFill>
+                <a:latin typeface="Garamond" panose="02020404030301010803" pitchFamily="18" charset="0"/>
+              </a:rPr>
+              <a:t>)</a:t>
             </a:r>
           </a:p>
           <a:p>
@@ -3642,8 +3663,8 @@
         </p:nvSpPr>
         <p:spPr>
           <a:xfrm>
-            <a:off x="15643470" y="24691927"/>
-            <a:ext cx="12619772" cy="5355312"/>
+            <a:off x="15421147" y="25325858"/>
+            <a:ext cx="12842095" cy="3693319"/>
           </a:xfrm>
           <a:prstGeom prst="rect">
             <a:avLst/>
@@ -3683,7 +3704,7 @@
                 </a:solidFill>
                 <a:latin typeface="Garamond" panose="02020404030301010803" pitchFamily="18" charset="0"/>
               </a:rPr>
-              <a:t>This dataset’s analysis encompasses linear regression, identification of influential points, hypothesis testing, and variable transformation.</a:t>
+              <a:t>This dataset’s analysis encompasses linear regression, identification of influential points, hypothesis testing, and variable transformation</a:t>
             </a:r>
           </a:p>
           <a:p>
@@ -3698,7 +3719,7 @@
                 </a:solidFill>
                 <a:latin typeface="Garamond" panose="02020404030301010803" pitchFamily="18" charset="0"/>
               </a:rPr>
-              <a:t>In this dataset, we will explore the data from the 2023 season of the PBR league, Touring Pro Division, to understand the factors that contribute to a rider's success and the performance, and the same for the bulls</a:t>
+              <a:t>Analyzing 2023 PBR Touring Pro Division data to grasp factors influencing rider and bull performance</a:t>
             </a:r>
           </a:p>
         </p:txBody>
@@ -3725,8 +3746,8 @@
         </p:blipFill>
         <p:spPr>
           <a:xfrm>
-            <a:off x="20611758" y="30102085"/>
-            <a:ext cx="2667684" cy="1646343"/>
+            <a:off x="20232450" y="30085590"/>
+            <a:ext cx="2888808" cy="1782808"/>
           </a:xfrm>
           <a:prstGeom prst="rect">
             <a:avLst/>
@@ -3747,7 +3768,7 @@
         </p:nvSpPr>
         <p:spPr>
           <a:xfrm>
-            <a:off x="30001124" y="25931464"/>
+            <a:off x="30015033" y="25910021"/>
             <a:ext cx="12275186" cy="3693319"/>
           </a:xfrm>
           <a:prstGeom prst="rect">
@@ -3788,7 +3809,7 @@
                 </a:solidFill>
                 <a:latin typeface="Garamond" panose="02020404030301010803" pitchFamily="18" charset="0"/>
               </a:rPr>
-              <a:t>For this investigation, we will be looking at the motorist statistics for all 12 stages of race. </a:t>
+              <a:t>For this investigation, we will be looking at the motorist statistics for all 12 stages of race.</a:t>
             </a:r>
           </a:p>
           <a:p>
@@ -3803,7 +3824,7 @@
                 </a:solidFill>
                 <a:latin typeface="Garamond" panose="02020404030301010803" pitchFamily="18" charset="0"/>
               </a:rPr>
-              <a:t>This dataset’s analysis will exemplify data visualization, uncovering patterns and insights within the race dynamics.</a:t>
+              <a:t>This dataset’s analysis will exemplify data visualization, uncovering patterns and insights within the race dynamics</a:t>
             </a:r>
           </a:p>
         </p:txBody>
@@ -3830,8 +3851,8 @@
         </p:blipFill>
         <p:spPr>
           <a:xfrm>
-            <a:off x="34926919" y="30102084"/>
-            <a:ext cx="2667686" cy="1646344"/>
+            <a:off x="34837905" y="30093907"/>
+            <a:ext cx="2888807" cy="1782807"/>
           </a:xfrm>
           <a:prstGeom prst="rect">
             <a:avLst/>
@@ -4360,7 +4381,7 @@
         </p:nvSpPr>
         <p:spPr>
           <a:xfrm>
-            <a:off x="1083581" y="28432267"/>
+            <a:off x="1148895" y="28318149"/>
             <a:ext cx="6497055" cy="2492990"/>
           </a:xfrm>
           <a:prstGeom prst="rect">
@@ -4490,8 +4511,8 @@
         </p:nvSpPr>
         <p:spPr>
           <a:xfrm>
-            <a:off x="15567980" y="13989186"/>
-            <a:ext cx="12275185" cy="4493538"/>
+            <a:off x="15414171" y="13989186"/>
+            <a:ext cx="12849071" cy="4493538"/>
           </a:xfrm>
           <a:prstGeom prst="rect">
             <a:avLst/>
@@ -4520,15 +4541,6 @@
               <a:buChar char="•"/>
             </a:pPr>
             <a:r>
-              <a:rPr lang="en-US" sz="4000" dirty="0">
-                <a:solidFill>
-                  <a:schemeClr val="bg1"/>
-                </a:solidFill>
-                <a:latin typeface="Garamond" panose="02020404030301010803" pitchFamily="18" charset="0"/>
-              </a:rPr>
-              <a:t> </a:t>
-            </a:r>
-            <a:r>
               <a:rPr lang="en-US" sz="3600" dirty="0">
                 <a:solidFill>
                   <a:schemeClr val="bg1"/>
@@ -4550,7 +4562,7 @@
                 </a:solidFill>
                 <a:latin typeface="Garamond" panose="02020404030301010803" pitchFamily="18" charset="0"/>
               </a:rPr>
-              <a:t>Riders must stay on a bucking bull as long as they can, using only one hand to hold on while the bull tries to throw them off. </a:t>
+              <a:t>Riders must stay on a bucking bull as long as they can, using only one hand to hold on while the bull tries to buck them off </a:t>
             </a:r>
           </a:p>
           <a:p>
@@ -4565,7 +4577,7 @@
                 </a:solidFill>
                 <a:latin typeface="Garamond" panose="02020404030301010803" pitchFamily="18" charset="0"/>
               </a:rPr>
-              <a:t>Score based on their performance, and the bull is also scored based on how well it bucks. </a:t>
+              <a:t>Rider Score based on ride performance, and the bull is scored based on how well it bucks </a:t>
             </a:r>
           </a:p>
         </p:txBody>
@@ -4584,8 +4596,8 @@
         </p:nvSpPr>
         <p:spPr>
           <a:xfrm>
-            <a:off x="29845435" y="14124845"/>
-            <a:ext cx="12789765" cy="6032421"/>
+            <a:off x="29865879" y="14203345"/>
+            <a:ext cx="12832861" cy="3231654"/>
           </a:xfrm>
           <a:prstGeom prst="rect">
             <a:avLst/>
@@ -4614,13 +4626,13 @@
               <a:buChar char="•"/>
             </a:pPr>
             <a:r>
-              <a:rPr lang="en-US" sz="4000" dirty="0">
+              <a:rPr lang="en-US" sz="3600" dirty="0">
                 <a:solidFill>
                   <a:schemeClr val="bg1"/>
                 </a:solidFill>
                 <a:latin typeface="Garamond" panose="02020404030301010803" pitchFamily="18" charset="0"/>
               </a:rPr>
-              <a:t>Annual off-road endurance event that typically spans over two weeks and covers thousands of kilometers across challenging terrain, and the most recent rally took place in Saudi Arabia. </a:t>
+              <a:t>Annual off-road endurance event, recently in Saudi Arabia, spans a few weeks,  and covering thousands of kilometers.</a:t>
             </a:r>
           </a:p>
           <a:p>
@@ -4629,13 +4641,13 @@
               <a:buChar char="•"/>
             </a:pPr>
             <a:r>
-              <a:rPr lang="en-US" sz="4000" dirty="0">
+              <a:rPr lang="en-US" sz="3600" dirty="0">
                 <a:solidFill>
                   <a:schemeClr val="bg1"/>
                 </a:solidFill>
                 <a:latin typeface="Garamond" panose="02020404030301010803" pitchFamily="18" charset="0"/>
               </a:rPr>
-              <a:t>Participants, including motorcyclists, drivers, and truckers, compete in various categories, facing extreme conditions like deserts, mountains, and dunes, making it one of the toughest motor-sport events in the world.</a:t>
+              <a:t>Motorcyclists, drivers, and truckers compete in extreme conditions, making it one of the world's toughest motor-sport events.</a:t>
             </a:r>
           </a:p>
         </p:txBody>
@@ -4687,10 +4699,10 @@
       </p:sp>
       <p:pic>
         <p:nvPicPr>
-          <p:cNvPr id="20" name="Picture 19" descr="A graph with a line and a blue line&#10;&#10;Description automatically generated">
+          <p:cNvPr id="14" name="Picture 13" descr="A graph with colored squares and black dots&#10;&#10;Description automatically generated">
             <a:extLst>
               <a:ext uri="{FF2B5EF4-FFF2-40B4-BE49-F238E27FC236}">
-                <a16:creationId xmlns:a16="http://schemas.microsoft.com/office/drawing/2014/main" id="{5E3342D5-8D7E-81C3-BE31-4FD31D35937C}"/>
+                <a16:creationId xmlns:a16="http://schemas.microsoft.com/office/drawing/2014/main" id="{F5F4007D-04C0-5DA7-E946-3B43EF3E01F9}"/>
               </a:ext>
             </a:extLst>
           </p:cNvPr>
@@ -4707,8 +4719,8 @@
         </p:blipFill>
         <p:spPr>
           <a:xfrm>
-            <a:off x="17079589" y="18782355"/>
-            <a:ext cx="9531260" cy="5882149"/>
+            <a:off x="30731210" y="18444058"/>
+            <a:ext cx="11102195" cy="6851640"/>
           </a:xfrm>
           <a:prstGeom prst="rect">
             <a:avLst/>
@@ -4717,10 +4729,10 @@
       </p:pic>
       <p:pic>
         <p:nvPicPr>
-          <p:cNvPr id="29" name="Picture 28" descr="A graph with a line and dots&#10;&#10;Description automatically generated">
+          <p:cNvPr id="19" name="Picture 18" descr="A graph showing the price of a rider points&#10;&#10;Description automatically generated">
             <a:extLst>
               <a:ext uri="{FF2B5EF4-FFF2-40B4-BE49-F238E27FC236}">
-                <a16:creationId xmlns:a16="http://schemas.microsoft.com/office/drawing/2014/main" id="{BD2485F5-CA46-0342-D881-DBC6D16C3FCD}"/>
+                <a16:creationId xmlns:a16="http://schemas.microsoft.com/office/drawing/2014/main" id="{9CC25E10-501A-DCE8-514A-396A37B8D74D}"/>
               </a:ext>
             </a:extLst>
           </p:cNvPr>
@@ -4737,8 +4749,8 @@
         </p:blipFill>
         <p:spPr>
           <a:xfrm>
-            <a:off x="31563923" y="20261058"/>
-            <a:ext cx="9352788" cy="5772006"/>
+            <a:off x="16270694" y="18482724"/>
+            <a:ext cx="10943592" cy="6753760"/>
           </a:xfrm>
           <a:prstGeom prst="rect">
             <a:avLst/>

</xml_diff>